<commit_message>
Modif serveur - Adam
</commit_message>
<xml_diff>
--- a/1-Documentations/A - Rendu Sprint 1/Acrobatt - Presentation 1.pptx
+++ b/1-Documentations/A - Rendu Sprint 1/Acrobatt - Presentation 1.pptx
@@ -7655,8 +7655,8 @@
     <dgm:cxn modelId="{BA98BCF8-17A1-4A4A-983B-BAC6713CEEC4}" srcId="{CE6AD165-47D3-4F17-B6E9-22C7A34E051E}" destId="{180C341F-255C-44A2-8CB1-9F65DC853C47}" srcOrd="2" destOrd="0" parTransId="{849CAE10-76BF-4059-8765-B31343B3ECAF}" sibTransId="{DBC8196A-A8B8-4411-AE07-474F5A9DF54E}"/>
     <dgm:cxn modelId="{459BE7F6-35ED-454F-9CCC-65C848988F51}" type="presOf" srcId="{F1135759-F115-42B5-860F-AEB46439CDE5}" destId="{7911E2E7-2627-471E-AB2C-5AA910CE9681}" srcOrd="0" destOrd="0" presId="urn:microsoft.com/office/officeart/2005/8/layout/hChevron3"/>
     <dgm:cxn modelId="{163CB3AA-74BF-4716-B430-6506F9695065}" srcId="{CE6AD165-47D3-4F17-B6E9-22C7A34E051E}" destId="{F1135759-F115-42B5-860F-AEB46439CDE5}" srcOrd="1" destOrd="0" parTransId="{F2AC748E-B668-4F61-BB00-261814CAF9F3}" sibTransId="{EDF4F846-57B3-4BD8-BBDC-BC731FCD7732}"/>
+    <dgm:cxn modelId="{379F44C2-7845-42AC-945B-E80F5CC29FAB}" type="presOf" srcId="{61C993BD-A7A8-4D3C-9914-A75DED14861E}" destId="{1592D397-8A22-433A-96C5-CEDBC9D6D623}" srcOrd="0" destOrd="0" presId="urn:microsoft.com/office/officeart/2005/8/layout/hChevron3"/>
     <dgm:cxn modelId="{6E99424B-1476-46BC-B0C3-9707326B52E6}" type="presOf" srcId="{772812CA-4199-419C-89D9-C929137C56E7}" destId="{B5DDE724-6AE3-4B31-80CF-92C5EDE53DBF}" srcOrd="0" destOrd="0" presId="urn:microsoft.com/office/officeart/2005/8/layout/hChevron3"/>
-    <dgm:cxn modelId="{379F44C2-7845-42AC-945B-E80F5CC29FAB}" type="presOf" srcId="{61C993BD-A7A8-4D3C-9914-A75DED14861E}" destId="{1592D397-8A22-433A-96C5-CEDBC9D6D623}" srcOrd="0" destOrd="0" presId="urn:microsoft.com/office/officeart/2005/8/layout/hChevron3"/>
     <dgm:cxn modelId="{C05477D0-682F-47AF-AD01-8A8DEF4AB84D}" type="presParOf" srcId="{5EAA882B-DC6A-427F-8F2D-9DA14DD0D170}" destId="{B5DDE724-6AE3-4B31-80CF-92C5EDE53DBF}" srcOrd="0" destOrd="0" presId="urn:microsoft.com/office/officeart/2005/8/layout/hChevron3"/>
     <dgm:cxn modelId="{B607FD56-920F-4675-9CF8-8A049D3ED296}" type="presParOf" srcId="{5EAA882B-DC6A-427F-8F2D-9DA14DD0D170}" destId="{CDD036BF-70FB-42A1-B948-01BF0BB795B9}" srcOrd="1" destOrd="0" presId="urn:microsoft.com/office/officeart/2005/8/layout/hChevron3"/>
     <dgm:cxn modelId="{2BDBDE25-FA05-4606-BC06-4790A749ABB8}" type="presParOf" srcId="{5EAA882B-DC6A-427F-8F2D-9DA14DD0D170}" destId="{7911E2E7-2627-471E-AB2C-5AA910CE9681}" srcOrd="2" destOrd="0" presId="urn:microsoft.com/office/officeart/2005/8/layout/hChevron3"/>
@@ -8545,6 +8545,294 @@
       <dsp:cNvGrpSpPr/>
     </dsp:nvGrpSpPr>
     <dsp:grpSpPr/>
+    <dsp:sp modelId="{B5DDE724-6AE3-4B31-80CF-92C5EDE53DBF}">
+      <dsp:nvSpPr>
+        <dsp:cNvPr id="0" name=""/>
+        <dsp:cNvSpPr/>
+      </dsp:nvSpPr>
+      <dsp:spPr>
+        <a:xfrm>
+          <a:off x="0" y="0"/>
+          <a:ext cx="2328305" cy="342726"/>
+        </a:xfrm>
+        <a:prstGeom prst="homePlate">
+          <a:avLst/>
+        </a:prstGeom>
+        <a:solidFill>
+          <a:srgbClr val="D67204"/>
+        </a:solidFill>
+        <a:ln w="25400" cap="flat" cmpd="sng" algn="ctr">
+          <a:solidFill>
+            <a:schemeClr val="lt1">
+              <a:hueOff val="0"/>
+              <a:satOff val="0"/>
+              <a:lumOff val="0"/>
+              <a:alphaOff val="0"/>
+            </a:schemeClr>
+          </a:solidFill>
+          <a:prstDash val="solid"/>
+        </a:ln>
+        <a:effectLst/>
+      </dsp:spPr>
+      <dsp:style>
+        <a:lnRef idx="2">
+          <a:scrgbClr r="0" g="0" b="0"/>
+        </a:lnRef>
+        <a:fillRef idx="1">
+          <a:scrgbClr r="0" g="0" b="0"/>
+        </a:fillRef>
+        <a:effectRef idx="0">
+          <a:scrgbClr r="0" g="0" b="0"/>
+        </a:effectRef>
+        <a:fontRef idx="minor">
+          <a:schemeClr val="lt1"/>
+        </a:fontRef>
+      </dsp:style>
+      <dsp:txBody>
+        <a:bodyPr spcFirstLastPara="0" vert="horz" wrap="square" lIns="90678" tIns="45339" rIns="22670" bIns="45339" numCol="1" spcCol="1270" anchor="ctr" anchorCtr="0">
+          <a:noAutofit/>
+        </a:bodyPr>
+        <a:lstStyle/>
+        <a:p>
+          <a:pPr lvl="0" algn="ctr" defTabSz="755650">
+            <a:lnSpc>
+              <a:spcPct val="90000"/>
+            </a:lnSpc>
+            <a:spcBef>
+              <a:spcPct val="0"/>
+            </a:spcBef>
+            <a:spcAft>
+              <a:spcPct val="35000"/>
+            </a:spcAft>
+          </a:pPr>
+          <a:r>
+            <a:rPr lang="fr-FR" sz="1700" kern="1200" dirty="0" smtClean="0"/>
+            <a:t>    Architecture         .</a:t>
+          </a:r>
+          <a:endParaRPr lang="fr-FR" sz="1700" kern="1200" dirty="0"/>
+        </a:p>
+      </dsp:txBody>
+      <dsp:txXfrm>
+        <a:off x="0" y="0"/>
+        <a:ext cx="2242624" cy="342726"/>
+      </dsp:txXfrm>
+    </dsp:sp>
+    <dsp:sp modelId="{7911E2E7-2627-471E-AB2C-5AA910CE9681}">
+      <dsp:nvSpPr>
+        <dsp:cNvPr id="0" name=""/>
+        <dsp:cNvSpPr/>
+      </dsp:nvSpPr>
+      <dsp:spPr>
+        <a:xfrm>
+          <a:off x="1864965" y="0"/>
+          <a:ext cx="2328305" cy="342726"/>
+        </a:xfrm>
+        <a:prstGeom prst="chevron">
+          <a:avLst/>
+        </a:prstGeom>
+        <a:solidFill>
+          <a:srgbClr val="F8AB6C"/>
+        </a:solidFill>
+        <a:ln w="25400" cap="flat" cmpd="sng" algn="ctr">
+          <a:solidFill>
+            <a:schemeClr val="lt1">
+              <a:hueOff val="0"/>
+              <a:satOff val="0"/>
+              <a:lumOff val="0"/>
+              <a:alphaOff val="0"/>
+            </a:schemeClr>
+          </a:solidFill>
+          <a:prstDash val="solid"/>
+        </a:ln>
+        <a:effectLst/>
+      </dsp:spPr>
+      <dsp:style>
+        <a:lnRef idx="2">
+          <a:scrgbClr r="0" g="0" b="0"/>
+        </a:lnRef>
+        <a:fillRef idx="1">
+          <a:scrgbClr r="0" g="0" b="0"/>
+        </a:fillRef>
+        <a:effectRef idx="0">
+          <a:scrgbClr r="0" g="0" b="0"/>
+        </a:effectRef>
+        <a:fontRef idx="minor">
+          <a:schemeClr val="lt1"/>
+        </a:fontRef>
+      </dsp:style>
+      <dsp:txBody>
+        <a:bodyPr spcFirstLastPara="0" vert="horz" wrap="square" lIns="68009" tIns="45339" rIns="22670" bIns="45339" numCol="1" spcCol="1270" anchor="ctr" anchorCtr="0">
+          <a:noAutofit/>
+        </a:bodyPr>
+        <a:lstStyle/>
+        <a:p>
+          <a:pPr lvl="0" algn="ctr" defTabSz="755650">
+            <a:lnSpc>
+              <a:spcPct val="90000"/>
+            </a:lnSpc>
+            <a:spcBef>
+              <a:spcPct val="0"/>
+            </a:spcBef>
+            <a:spcAft>
+              <a:spcPct val="35000"/>
+            </a:spcAft>
+          </a:pPr>
+          <a:r>
+            <a:rPr lang="fr-FR" sz="1700" kern="1200" dirty="0" smtClean="0"/>
+            <a:t>        Le chat             .</a:t>
+          </a:r>
+          <a:endParaRPr lang="fr-FR" sz="1700" kern="1200" dirty="0"/>
+        </a:p>
+      </dsp:txBody>
+      <dsp:txXfrm>
+        <a:off x="2036328" y="0"/>
+        <a:ext cx="1985579" cy="342726"/>
+      </dsp:txXfrm>
+    </dsp:sp>
+    <dsp:sp modelId="{78EDF3AE-B3A5-4ADD-8D56-731F1A2BDD36}">
+      <dsp:nvSpPr>
+        <dsp:cNvPr id="0" name=""/>
+        <dsp:cNvSpPr/>
+      </dsp:nvSpPr>
+      <dsp:spPr>
+        <a:xfrm>
+          <a:off x="3727609" y="0"/>
+          <a:ext cx="2328305" cy="342726"/>
+        </a:xfrm>
+        <a:prstGeom prst="chevron">
+          <a:avLst/>
+        </a:prstGeom>
+        <a:solidFill>
+          <a:srgbClr val="F8AB6C"/>
+        </a:solidFill>
+        <a:ln w="25400" cap="flat" cmpd="sng" algn="ctr">
+          <a:solidFill>
+            <a:schemeClr val="lt1">
+              <a:hueOff val="0"/>
+              <a:satOff val="0"/>
+              <a:lumOff val="0"/>
+              <a:alphaOff val="0"/>
+            </a:schemeClr>
+          </a:solidFill>
+          <a:prstDash val="solid"/>
+        </a:ln>
+        <a:effectLst/>
+      </dsp:spPr>
+      <dsp:style>
+        <a:lnRef idx="2">
+          <a:scrgbClr r="0" g="0" b="0"/>
+        </a:lnRef>
+        <a:fillRef idx="1">
+          <a:scrgbClr r="0" g="0" b="0"/>
+        </a:fillRef>
+        <a:effectRef idx="0">
+          <a:scrgbClr r="0" g="0" b="0"/>
+        </a:effectRef>
+        <a:fontRef idx="minor">
+          <a:schemeClr val="lt1"/>
+        </a:fontRef>
+      </dsp:style>
+      <dsp:txBody>
+        <a:bodyPr spcFirstLastPara="0" vert="horz" wrap="square" lIns="68009" tIns="45339" rIns="22670" bIns="45339" numCol="1" spcCol="1270" anchor="ctr" anchorCtr="0">
+          <a:noAutofit/>
+        </a:bodyPr>
+        <a:lstStyle/>
+        <a:p>
+          <a:pPr lvl="0" algn="ctr" defTabSz="755650">
+            <a:lnSpc>
+              <a:spcPct val="90000"/>
+            </a:lnSpc>
+            <a:spcBef>
+              <a:spcPct val="0"/>
+            </a:spcBef>
+            <a:spcAft>
+              <a:spcPct val="35000"/>
+            </a:spcAft>
+          </a:pPr>
+          <a:r>
+            <a:rPr lang="fr-FR" sz="1700" kern="1200" dirty="0" smtClean="0"/>
+            <a:t>     Le serveur           .</a:t>
+          </a:r>
+          <a:endParaRPr lang="fr-FR" sz="1700" kern="1200" dirty="0"/>
+        </a:p>
+      </dsp:txBody>
+      <dsp:txXfrm>
+        <a:off x="3898972" y="0"/>
+        <a:ext cx="1985579" cy="342726"/>
+      </dsp:txXfrm>
+    </dsp:sp>
+    <dsp:sp modelId="{1592D397-8A22-433A-96C5-CEDBC9D6D623}">
+      <dsp:nvSpPr>
+        <dsp:cNvPr id="0" name=""/>
+        <dsp:cNvSpPr/>
+      </dsp:nvSpPr>
+      <dsp:spPr>
+        <a:xfrm>
+          <a:off x="5590253" y="0"/>
+          <a:ext cx="2328305" cy="342726"/>
+        </a:xfrm>
+        <a:prstGeom prst="chevron">
+          <a:avLst/>
+        </a:prstGeom>
+        <a:solidFill>
+          <a:srgbClr val="F8AB6C"/>
+        </a:solidFill>
+        <a:ln w="25400" cap="flat" cmpd="sng" algn="ctr">
+          <a:solidFill>
+            <a:schemeClr val="lt1">
+              <a:hueOff val="0"/>
+              <a:satOff val="0"/>
+              <a:lumOff val="0"/>
+              <a:alphaOff val="0"/>
+            </a:schemeClr>
+          </a:solidFill>
+          <a:prstDash val="solid"/>
+        </a:ln>
+        <a:effectLst/>
+      </dsp:spPr>
+      <dsp:style>
+        <a:lnRef idx="2">
+          <a:scrgbClr r="0" g="0" b="0"/>
+        </a:lnRef>
+        <a:fillRef idx="1">
+          <a:scrgbClr r="0" g="0" b="0"/>
+        </a:fillRef>
+        <a:effectRef idx="0">
+          <a:scrgbClr r="0" g="0" b="0"/>
+        </a:effectRef>
+        <a:fontRef idx="minor">
+          <a:schemeClr val="lt1"/>
+        </a:fontRef>
+      </dsp:style>
+      <dsp:txBody>
+        <a:bodyPr spcFirstLastPara="0" vert="horz" wrap="square" lIns="68009" tIns="45339" rIns="22670" bIns="45339" numCol="1" spcCol="1270" anchor="ctr" anchorCtr="0">
+          <a:noAutofit/>
+        </a:bodyPr>
+        <a:lstStyle/>
+        <a:p>
+          <a:pPr lvl="0" algn="ctr" defTabSz="755650">
+            <a:lnSpc>
+              <a:spcPct val="90000"/>
+            </a:lnSpc>
+            <a:spcBef>
+              <a:spcPct val="0"/>
+            </a:spcBef>
+            <a:spcAft>
+              <a:spcPct val="35000"/>
+            </a:spcAft>
+          </a:pPr>
+          <a:r>
+            <a:rPr lang="fr-FR" sz="1700" kern="1200" dirty="0" smtClean="0"/>
+            <a:t>Conclusion</a:t>
+          </a:r>
+          <a:endParaRPr lang="fr-FR" sz="1700" kern="1200" dirty="0"/>
+        </a:p>
+      </dsp:txBody>
+      <dsp:txXfrm>
+        <a:off x="5761616" y="0"/>
+        <a:ext cx="1985579" cy="342726"/>
+      </dsp:txXfrm>
+    </dsp:sp>
   </dsp:spTree>
 </dsp:drawing>
 </file>
@@ -8557,6 +8845,294 @@
       <dsp:cNvGrpSpPr/>
     </dsp:nvGrpSpPr>
     <dsp:grpSpPr/>
+    <dsp:sp modelId="{B5DDE724-6AE3-4B31-80CF-92C5EDE53DBF}">
+      <dsp:nvSpPr>
+        <dsp:cNvPr id="0" name=""/>
+        <dsp:cNvSpPr/>
+      </dsp:nvSpPr>
+      <dsp:spPr>
+        <a:xfrm>
+          <a:off x="0" y="0"/>
+          <a:ext cx="2328305" cy="342726"/>
+        </a:xfrm>
+        <a:prstGeom prst="homePlate">
+          <a:avLst/>
+        </a:prstGeom>
+        <a:solidFill>
+          <a:srgbClr val="D67204"/>
+        </a:solidFill>
+        <a:ln w="25400" cap="flat" cmpd="sng" algn="ctr">
+          <a:solidFill>
+            <a:schemeClr val="lt1">
+              <a:hueOff val="0"/>
+              <a:satOff val="0"/>
+              <a:lumOff val="0"/>
+              <a:alphaOff val="0"/>
+            </a:schemeClr>
+          </a:solidFill>
+          <a:prstDash val="solid"/>
+        </a:ln>
+        <a:effectLst/>
+      </dsp:spPr>
+      <dsp:style>
+        <a:lnRef idx="2">
+          <a:scrgbClr r="0" g="0" b="0"/>
+        </a:lnRef>
+        <a:fillRef idx="1">
+          <a:scrgbClr r="0" g="0" b="0"/>
+        </a:fillRef>
+        <a:effectRef idx="0">
+          <a:scrgbClr r="0" g="0" b="0"/>
+        </a:effectRef>
+        <a:fontRef idx="minor">
+          <a:schemeClr val="lt1"/>
+        </a:fontRef>
+      </dsp:style>
+      <dsp:txBody>
+        <a:bodyPr spcFirstLastPara="0" vert="horz" wrap="square" lIns="90678" tIns="45339" rIns="22670" bIns="45339" numCol="1" spcCol="1270" anchor="ctr" anchorCtr="0">
+          <a:noAutofit/>
+        </a:bodyPr>
+        <a:lstStyle/>
+        <a:p>
+          <a:pPr lvl="0" algn="ctr" defTabSz="755650">
+            <a:lnSpc>
+              <a:spcPct val="90000"/>
+            </a:lnSpc>
+            <a:spcBef>
+              <a:spcPct val="0"/>
+            </a:spcBef>
+            <a:spcAft>
+              <a:spcPct val="35000"/>
+            </a:spcAft>
+          </a:pPr>
+          <a:r>
+            <a:rPr lang="fr-FR" sz="1700" kern="1200" dirty="0" smtClean="0"/>
+            <a:t>    Architecture         .</a:t>
+          </a:r>
+          <a:endParaRPr lang="fr-FR" sz="1700" kern="1200" dirty="0"/>
+        </a:p>
+      </dsp:txBody>
+      <dsp:txXfrm>
+        <a:off x="0" y="0"/>
+        <a:ext cx="2242624" cy="342726"/>
+      </dsp:txXfrm>
+    </dsp:sp>
+    <dsp:sp modelId="{7911E2E7-2627-471E-AB2C-5AA910CE9681}">
+      <dsp:nvSpPr>
+        <dsp:cNvPr id="0" name=""/>
+        <dsp:cNvSpPr/>
+      </dsp:nvSpPr>
+      <dsp:spPr>
+        <a:xfrm>
+          <a:off x="1864965" y="0"/>
+          <a:ext cx="2328305" cy="342726"/>
+        </a:xfrm>
+        <a:prstGeom prst="chevron">
+          <a:avLst/>
+        </a:prstGeom>
+        <a:solidFill>
+          <a:srgbClr val="F8AB6C"/>
+        </a:solidFill>
+        <a:ln w="25400" cap="flat" cmpd="sng" algn="ctr">
+          <a:solidFill>
+            <a:schemeClr val="lt1">
+              <a:hueOff val="0"/>
+              <a:satOff val="0"/>
+              <a:lumOff val="0"/>
+              <a:alphaOff val="0"/>
+            </a:schemeClr>
+          </a:solidFill>
+          <a:prstDash val="solid"/>
+        </a:ln>
+        <a:effectLst/>
+      </dsp:spPr>
+      <dsp:style>
+        <a:lnRef idx="2">
+          <a:scrgbClr r="0" g="0" b="0"/>
+        </a:lnRef>
+        <a:fillRef idx="1">
+          <a:scrgbClr r="0" g="0" b="0"/>
+        </a:fillRef>
+        <a:effectRef idx="0">
+          <a:scrgbClr r="0" g="0" b="0"/>
+        </a:effectRef>
+        <a:fontRef idx="minor">
+          <a:schemeClr val="lt1"/>
+        </a:fontRef>
+      </dsp:style>
+      <dsp:txBody>
+        <a:bodyPr spcFirstLastPara="0" vert="horz" wrap="square" lIns="68009" tIns="45339" rIns="22670" bIns="45339" numCol="1" spcCol="1270" anchor="ctr" anchorCtr="0">
+          <a:noAutofit/>
+        </a:bodyPr>
+        <a:lstStyle/>
+        <a:p>
+          <a:pPr lvl="0" algn="ctr" defTabSz="755650">
+            <a:lnSpc>
+              <a:spcPct val="90000"/>
+            </a:lnSpc>
+            <a:spcBef>
+              <a:spcPct val="0"/>
+            </a:spcBef>
+            <a:spcAft>
+              <a:spcPct val="35000"/>
+            </a:spcAft>
+          </a:pPr>
+          <a:r>
+            <a:rPr lang="fr-FR" sz="1700" kern="1200" dirty="0" smtClean="0"/>
+            <a:t>        Le chat             .</a:t>
+          </a:r>
+          <a:endParaRPr lang="fr-FR" sz="1700" kern="1200" dirty="0"/>
+        </a:p>
+      </dsp:txBody>
+      <dsp:txXfrm>
+        <a:off x="2036328" y="0"/>
+        <a:ext cx="1985579" cy="342726"/>
+      </dsp:txXfrm>
+    </dsp:sp>
+    <dsp:sp modelId="{78EDF3AE-B3A5-4ADD-8D56-731F1A2BDD36}">
+      <dsp:nvSpPr>
+        <dsp:cNvPr id="0" name=""/>
+        <dsp:cNvSpPr/>
+      </dsp:nvSpPr>
+      <dsp:spPr>
+        <a:xfrm>
+          <a:off x="3727609" y="0"/>
+          <a:ext cx="2328305" cy="342726"/>
+        </a:xfrm>
+        <a:prstGeom prst="chevron">
+          <a:avLst/>
+        </a:prstGeom>
+        <a:solidFill>
+          <a:srgbClr val="F8AB6C"/>
+        </a:solidFill>
+        <a:ln w="25400" cap="flat" cmpd="sng" algn="ctr">
+          <a:solidFill>
+            <a:schemeClr val="lt1">
+              <a:hueOff val="0"/>
+              <a:satOff val="0"/>
+              <a:lumOff val="0"/>
+              <a:alphaOff val="0"/>
+            </a:schemeClr>
+          </a:solidFill>
+          <a:prstDash val="solid"/>
+        </a:ln>
+        <a:effectLst/>
+      </dsp:spPr>
+      <dsp:style>
+        <a:lnRef idx="2">
+          <a:scrgbClr r="0" g="0" b="0"/>
+        </a:lnRef>
+        <a:fillRef idx="1">
+          <a:scrgbClr r="0" g="0" b="0"/>
+        </a:fillRef>
+        <a:effectRef idx="0">
+          <a:scrgbClr r="0" g="0" b="0"/>
+        </a:effectRef>
+        <a:fontRef idx="minor">
+          <a:schemeClr val="lt1"/>
+        </a:fontRef>
+      </dsp:style>
+      <dsp:txBody>
+        <a:bodyPr spcFirstLastPara="0" vert="horz" wrap="square" lIns="68009" tIns="45339" rIns="22670" bIns="45339" numCol="1" spcCol="1270" anchor="ctr" anchorCtr="0">
+          <a:noAutofit/>
+        </a:bodyPr>
+        <a:lstStyle/>
+        <a:p>
+          <a:pPr lvl="0" algn="ctr" defTabSz="755650">
+            <a:lnSpc>
+              <a:spcPct val="90000"/>
+            </a:lnSpc>
+            <a:spcBef>
+              <a:spcPct val="0"/>
+            </a:spcBef>
+            <a:spcAft>
+              <a:spcPct val="35000"/>
+            </a:spcAft>
+          </a:pPr>
+          <a:r>
+            <a:rPr lang="fr-FR" sz="1700" kern="1200" dirty="0" smtClean="0"/>
+            <a:t>     Le serveur           .</a:t>
+          </a:r>
+          <a:endParaRPr lang="fr-FR" sz="1700" kern="1200" dirty="0"/>
+        </a:p>
+      </dsp:txBody>
+      <dsp:txXfrm>
+        <a:off x="3898972" y="0"/>
+        <a:ext cx="1985579" cy="342726"/>
+      </dsp:txXfrm>
+    </dsp:sp>
+    <dsp:sp modelId="{1592D397-8A22-433A-96C5-CEDBC9D6D623}">
+      <dsp:nvSpPr>
+        <dsp:cNvPr id="0" name=""/>
+        <dsp:cNvSpPr/>
+      </dsp:nvSpPr>
+      <dsp:spPr>
+        <a:xfrm>
+          <a:off x="5590253" y="0"/>
+          <a:ext cx="2328305" cy="342726"/>
+        </a:xfrm>
+        <a:prstGeom prst="chevron">
+          <a:avLst/>
+        </a:prstGeom>
+        <a:solidFill>
+          <a:srgbClr val="F8AB6C"/>
+        </a:solidFill>
+        <a:ln w="25400" cap="flat" cmpd="sng" algn="ctr">
+          <a:solidFill>
+            <a:schemeClr val="lt1">
+              <a:hueOff val="0"/>
+              <a:satOff val="0"/>
+              <a:lumOff val="0"/>
+              <a:alphaOff val="0"/>
+            </a:schemeClr>
+          </a:solidFill>
+          <a:prstDash val="solid"/>
+        </a:ln>
+        <a:effectLst/>
+      </dsp:spPr>
+      <dsp:style>
+        <a:lnRef idx="2">
+          <a:scrgbClr r="0" g="0" b="0"/>
+        </a:lnRef>
+        <a:fillRef idx="1">
+          <a:scrgbClr r="0" g="0" b="0"/>
+        </a:fillRef>
+        <a:effectRef idx="0">
+          <a:scrgbClr r="0" g="0" b="0"/>
+        </a:effectRef>
+        <a:fontRef idx="minor">
+          <a:schemeClr val="lt1"/>
+        </a:fontRef>
+      </dsp:style>
+      <dsp:txBody>
+        <a:bodyPr spcFirstLastPara="0" vert="horz" wrap="square" lIns="68009" tIns="45339" rIns="22670" bIns="45339" numCol="1" spcCol="1270" anchor="ctr" anchorCtr="0">
+          <a:noAutofit/>
+        </a:bodyPr>
+        <a:lstStyle/>
+        <a:p>
+          <a:pPr lvl="0" algn="ctr" defTabSz="755650">
+            <a:lnSpc>
+              <a:spcPct val="90000"/>
+            </a:lnSpc>
+            <a:spcBef>
+              <a:spcPct val="0"/>
+            </a:spcBef>
+            <a:spcAft>
+              <a:spcPct val="35000"/>
+            </a:spcAft>
+          </a:pPr>
+          <a:r>
+            <a:rPr lang="fr-FR" sz="1700" kern="1200" dirty="0" smtClean="0"/>
+            <a:t>Conclusion</a:t>
+          </a:r>
+          <a:endParaRPr lang="fr-FR" sz="1700" kern="1200" dirty="0"/>
+        </a:p>
+      </dsp:txBody>
+      <dsp:txXfrm>
+        <a:off x="5761616" y="0"/>
+        <a:ext cx="1985579" cy="342726"/>
+      </dsp:txXfrm>
+    </dsp:sp>
   </dsp:spTree>
 </dsp:drawing>
 </file>
@@ -8569,6 +9145,294 @@
       <dsp:cNvGrpSpPr/>
     </dsp:nvGrpSpPr>
     <dsp:grpSpPr/>
+    <dsp:sp modelId="{B5DDE724-6AE3-4B31-80CF-92C5EDE53DBF}">
+      <dsp:nvSpPr>
+        <dsp:cNvPr id="0" name=""/>
+        <dsp:cNvSpPr/>
+      </dsp:nvSpPr>
+      <dsp:spPr>
+        <a:xfrm>
+          <a:off x="0" y="0"/>
+          <a:ext cx="2328305" cy="342726"/>
+        </a:xfrm>
+        <a:prstGeom prst="homePlate">
+          <a:avLst/>
+        </a:prstGeom>
+        <a:solidFill>
+          <a:srgbClr val="F8AB6C"/>
+        </a:solidFill>
+        <a:ln w="25400" cap="flat" cmpd="sng" algn="ctr">
+          <a:solidFill>
+            <a:schemeClr val="lt1">
+              <a:hueOff val="0"/>
+              <a:satOff val="0"/>
+              <a:lumOff val="0"/>
+              <a:alphaOff val="0"/>
+            </a:schemeClr>
+          </a:solidFill>
+          <a:prstDash val="solid"/>
+        </a:ln>
+        <a:effectLst/>
+      </dsp:spPr>
+      <dsp:style>
+        <a:lnRef idx="2">
+          <a:scrgbClr r="0" g="0" b="0"/>
+        </a:lnRef>
+        <a:fillRef idx="1">
+          <a:scrgbClr r="0" g="0" b="0"/>
+        </a:fillRef>
+        <a:effectRef idx="0">
+          <a:scrgbClr r="0" g="0" b="0"/>
+        </a:effectRef>
+        <a:fontRef idx="minor">
+          <a:schemeClr val="lt1"/>
+        </a:fontRef>
+      </dsp:style>
+      <dsp:txBody>
+        <a:bodyPr spcFirstLastPara="0" vert="horz" wrap="square" lIns="90678" tIns="45339" rIns="22670" bIns="45339" numCol="1" spcCol="1270" anchor="ctr" anchorCtr="0">
+          <a:noAutofit/>
+        </a:bodyPr>
+        <a:lstStyle/>
+        <a:p>
+          <a:pPr lvl="0" algn="ctr" defTabSz="755650">
+            <a:lnSpc>
+              <a:spcPct val="90000"/>
+            </a:lnSpc>
+            <a:spcBef>
+              <a:spcPct val="0"/>
+            </a:spcBef>
+            <a:spcAft>
+              <a:spcPct val="35000"/>
+            </a:spcAft>
+          </a:pPr>
+          <a:r>
+            <a:rPr lang="fr-FR" sz="1700" kern="1200" dirty="0" smtClean="0"/>
+            <a:t>    Architecture         .</a:t>
+          </a:r>
+          <a:endParaRPr lang="fr-FR" sz="1700" kern="1200" dirty="0"/>
+        </a:p>
+      </dsp:txBody>
+      <dsp:txXfrm>
+        <a:off x="0" y="0"/>
+        <a:ext cx="2242624" cy="342726"/>
+      </dsp:txXfrm>
+    </dsp:sp>
+    <dsp:sp modelId="{7911E2E7-2627-471E-AB2C-5AA910CE9681}">
+      <dsp:nvSpPr>
+        <dsp:cNvPr id="0" name=""/>
+        <dsp:cNvSpPr/>
+      </dsp:nvSpPr>
+      <dsp:spPr>
+        <a:xfrm>
+          <a:off x="1864965" y="0"/>
+          <a:ext cx="2328305" cy="342726"/>
+        </a:xfrm>
+        <a:prstGeom prst="chevron">
+          <a:avLst/>
+        </a:prstGeom>
+        <a:solidFill>
+          <a:srgbClr val="D67204"/>
+        </a:solidFill>
+        <a:ln w="25400" cap="flat" cmpd="sng" algn="ctr">
+          <a:solidFill>
+            <a:schemeClr val="lt1">
+              <a:hueOff val="0"/>
+              <a:satOff val="0"/>
+              <a:lumOff val="0"/>
+              <a:alphaOff val="0"/>
+            </a:schemeClr>
+          </a:solidFill>
+          <a:prstDash val="solid"/>
+        </a:ln>
+        <a:effectLst/>
+      </dsp:spPr>
+      <dsp:style>
+        <a:lnRef idx="2">
+          <a:scrgbClr r="0" g="0" b="0"/>
+        </a:lnRef>
+        <a:fillRef idx="1">
+          <a:scrgbClr r="0" g="0" b="0"/>
+        </a:fillRef>
+        <a:effectRef idx="0">
+          <a:scrgbClr r="0" g="0" b="0"/>
+        </a:effectRef>
+        <a:fontRef idx="minor">
+          <a:schemeClr val="lt1"/>
+        </a:fontRef>
+      </dsp:style>
+      <dsp:txBody>
+        <a:bodyPr spcFirstLastPara="0" vert="horz" wrap="square" lIns="68009" tIns="45339" rIns="22670" bIns="45339" numCol="1" spcCol="1270" anchor="ctr" anchorCtr="0">
+          <a:noAutofit/>
+        </a:bodyPr>
+        <a:lstStyle/>
+        <a:p>
+          <a:pPr lvl="0" algn="ctr" defTabSz="755650">
+            <a:lnSpc>
+              <a:spcPct val="90000"/>
+            </a:lnSpc>
+            <a:spcBef>
+              <a:spcPct val="0"/>
+            </a:spcBef>
+            <a:spcAft>
+              <a:spcPct val="35000"/>
+            </a:spcAft>
+          </a:pPr>
+          <a:r>
+            <a:rPr lang="fr-FR" sz="1700" kern="1200" dirty="0" smtClean="0"/>
+            <a:t>        Le chat             .</a:t>
+          </a:r>
+          <a:endParaRPr lang="fr-FR" sz="1700" kern="1200" dirty="0"/>
+        </a:p>
+      </dsp:txBody>
+      <dsp:txXfrm>
+        <a:off x="2036328" y="0"/>
+        <a:ext cx="1985579" cy="342726"/>
+      </dsp:txXfrm>
+    </dsp:sp>
+    <dsp:sp modelId="{78EDF3AE-B3A5-4ADD-8D56-731F1A2BDD36}">
+      <dsp:nvSpPr>
+        <dsp:cNvPr id="0" name=""/>
+        <dsp:cNvSpPr/>
+      </dsp:nvSpPr>
+      <dsp:spPr>
+        <a:xfrm>
+          <a:off x="3727609" y="0"/>
+          <a:ext cx="2328305" cy="342726"/>
+        </a:xfrm>
+        <a:prstGeom prst="chevron">
+          <a:avLst/>
+        </a:prstGeom>
+        <a:solidFill>
+          <a:srgbClr val="F8AB6C"/>
+        </a:solidFill>
+        <a:ln w="25400" cap="flat" cmpd="sng" algn="ctr">
+          <a:solidFill>
+            <a:schemeClr val="lt1">
+              <a:hueOff val="0"/>
+              <a:satOff val="0"/>
+              <a:lumOff val="0"/>
+              <a:alphaOff val="0"/>
+            </a:schemeClr>
+          </a:solidFill>
+          <a:prstDash val="solid"/>
+        </a:ln>
+        <a:effectLst/>
+      </dsp:spPr>
+      <dsp:style>
+        <a:lnRef idx="2">
+          <a:scrgbClr r="0" g="0" b="0"/>
+        </a:lnRef>
+        <a:fillRef idx="1">
+          <a:scrgbClr r="0" g="0" b="0"/>
+        </a:fillRef>
+        <a:effectRef idx="0">
+          <a:scrgbClr r="0" g="0" b="0"/>
+        </a:effectRef>
+        <a:fontRef idx="minor">
+          <a:schemeClr val="lt1"/>
+        </a:fontRef>
+      </dsp:style>
+      <dsp:txBody>
+        <a:bodyPr spcFirstLastPara="0" vert="horz" wrap="square" lIns="68009" tIns="45339" rIns="22670" bIns="45339" numCol="1" spcCol="1270" anchor="ctr" anchorCtr="0">
+          <a:noAutofit/>
+        </a:bodyPr>
+        <a:lstStyle/>
+        <a:p>
+          <a:pPr lvl="0" algn="ctr" defTabSz="755650">
+            <a:lnSpc>
+              <a:spcPct val="90000"/>
+            </a:lnSpc>
+            <a:spcBef>
+              <a:spcPct val="0"/>
+            </a:spcBef>
+            <a:spcAft>
+              <a:spcPct val="35000"/>
+            </a:spcAft>
+          </a:pPr>
+          <a:r>
+            <a:rPr lang="fr-FR" sz="1700" kern="1200" dirty="0" smtClean="0"/>
+            <a:t>     Le serveur           .</a:t>
+          </a:r>
+          <a:endParaRPr lang="fr-FR" sz="1700" kern="1200" dirty="0"/>
+        </a:p>
+      </dsp:txBody>
+      <dsp:txXfrm>
+        <a:off x="3898972" y="0"/>
+        <a:ext cx="1985579" cy="342726"/>
+      </dsp:txXfrm>
+    </dsp:sp>
+    <dsp:sp modelId="{1592D397-8A22-433A-96C5-CEDBC9D6D623}">
+      <dsp:nvSpPr>
+        <dsp:cNvPr id="0" name=""/>
+        <dsp:cNvSpPr/>
+      </dsp:nvSpPr>
+      <dsp:spPr>
+        <a:xfrm>
+          <a:off x="5590253" y="0"/>
+          <a:ext cx="2328305" cy="342726"/>
+        </a:xfrm>
+        <a:prstGeom prst="chevron">
+          <a:avLst/>
+        </a:prstGeom>
+        <a:solidFill>
+          <a:srgbClr val="F8AB6C"/>
+        </a:solidFill>
+        <a:ln w="25400" cap="flat" cmpd="sng" algn="ctr">
+          <a:solidFill>
+            <a:schemeClr val="lt1">
+              <a:hueOff val="0"/>
+              <a:satOff val="0"/>
+              <a:lumOff val="0"/>
+              <a:alphaOff val="0"/>
+            </a:schemeClr>
+          </a:solidFill>
+          <a:prstDash val="solid"/>
+        </a:ln>
+        <a:effectLst/>
+      </dsp:spPr>
+      <dsp:style>
+        <a:lnRef idx="2">
+          <a:scrgbClr r="0" g="0" b="0"/>
+        </a:lnRef>
+        <a:fillRef idx="1">
+          <a:scrgbClr r="0" g="0" b="0"/>
+        </a:fillRef>
+        <a:effectRef idx="0">
+          <a:scrgbClr r="0" g="0" b="0"/>
+        </a:effectRef>
+        <a:fontRef idx="minor">
+          <a:schemeClr val="lt1"/>
+        </a:fontRef>
+      </dsp:style>
+      <dsp:txBody>
+        <a:bodyPr spcFirstLastPara="0" vert="horz" wrap="square" lIns="68009" tIns="45339" rIns="22670" bIns="45339" numCol="1" spcCol="1270" anchor="ctr" anchorCtr="0">
+          <a:noAutofit/>
+        </a:bodyPr>
+        <a:lstStyle/>
+        <a:p>
+          <a:pPr lvl="0" algn="ctr" defTabSz="755650">
+            <a:lnSpc>
+              <a:spcPct val="90000"/>
+            </a:lnSpc>
+            <a:spcBef>
+              <a:spcPct val="0"/>
+            </a:spcBef>
+            <a:spcAft>
+              <a:spcPct val="35000"/>
+            </a:spcAft>
+          </a:pPr>
+          <a:r>
+            <a:rPr lang="fr-FR" sz="1700" kern="1200" dirty="0" smtClean="0"/>
+            <a:t>Conclusion</a:t>
+          </a:r>
+          <a:endParaRPr lang="fr-FR" sz="1700" kern="1200" dirty="0"/>
+        </a:p>
+      </dsp:txBody>
+      <dsp:txXfrm>
+        <a:off x="5761616" y="0"/>
+        <a:ext cx="1985579" cy="342726"/>
+      </dsp:txXfrm>
+    </dsp:sp>
   </dsp:spTree>
 </dsp:drawing>
 </file>
@@ -8581,6 +9445,294 @@
       <dsp:cNvGrpSpPr/>
     </dsp:nvGrpSpPr>
     <dsp:grpSpPr/>
+    <dsp:sp modelId="{B5DDE724-6AE3-4B31-80CF-92C5EDE53DBF}">
+      <dsp:nvSpPr>
+        <dsp:cNvPr id="0" name=""/>
+        <dsp:cNvSpPr/>
+      </dsp:nvSpPr>
+      <dsp:spPr>
+        <a:xfrm>
+          <a:off x="0" y="0"/>
+          <a:ext cx="2328305" cy="342726"/>
+        </a:xfrm>
+        <a:prstGeom prst="homePlate">
+          <a:avLst/>
+        </a:prstGeom>
+        <a:solidFill>
+          <a:srgbClr val="F8AB6C"/>
+        </a:solidFill>
+        <a:ln w="25400" cap="flat" cmpd="sng" algn="ctr">
+          <a:solidFill>
+            <a:schemeClr val="lt1">
+              <a:hueOff val="0"/>
+              <a:satOff val="0"/>
+              <a:lumOff val="0"/>
+              <a:alphaOff val="0"/>
+            </a:schemeClr>
+          </a:solidFill>
+          <a:prstDash val="solid"/>
+        </a:ln>
+        <a:effectLst/>
+      </dsp:spPr>
+      <dsp:style>
+        <a:lnRef idx="2">
+          <a:scrgbClr r="0" g="0" b="0"/>
+        </a:lnRef>
+        <a:fillRef idx="1">
+          <a:scrgbClr r="0" g="0" b="0"/>
+        </a:fillRef>
+        <a:effectRef idx="0">
+          <a:scrgbClr r="0" g="0" b="0"/>
+        </a:effectRef>
+        <a:fontRef idx="minor">
+          <a:schemeClr val="lt1"/>
+        </a:fontRef>
+      </dsp:style>
+      <dsp:txBody>
+        <a:bodyPr spcFirstLastPara="0" vert="horz" wrap="square" lIns="90678" tIns="45339" rIns="22670" bIns="45339" numCol="1" spcCol="1270" anchor="ctr" anchorCtr="0">
+          <a:noAutofit/>
+        </a:bodyPr>
+        <a:lstStyle/>
+        <a:p>
+          <a:pPr lvl="0" algn="ctr" defTabSz="755650">
+            <a:lnSpc>
+              <a:spcPct val="90000"/>
+            </a:lnSpc>
+            <a:spcBef>
+              <a:spcPct val="0"/>
+            </a:spcBef>
+            <a:spcAft>
+              <a:spcPct val="35000"/>
+            </a:spcAft>
+          </a:pPr>
+          <a:r>
+            <a:rPr lang="fr-FR" sz="1700" kern="1200" dirty="0" smtClean="0"/>
+            <a:t>    Architecture         .</a:t>
+          </a:r>
+          <a:endParaRPr lang="fr-FR" sz="1700" kern="1200" dirty="0"/>
+        </a:p>
+      </dsp:txBody>
+      <dsp:txXfrm>
+        <a:off x="0" y="0"/>
+        <a:ext cx="2242624" cy="342726"/>
+      </dsp:txXfrm>
+    </dsp:sp>
+    <dsp:sp modelId="{7911E2E7-2627-471E-AB2C-5AA910CE9681}">
+      <dsp:nvSpPr>
+        <dsp:cNvPr id="0" name=""/>
+        <dsp:cNvSpPr/>
+      </dsp:nvSpPr>
+      <dsp:spPr>
+        <a:xfrm>
+          <a:off x="1864965" y="0"/>
+          <a:ext cx="2328305" cy="342726"/>
+        </a:xfrm>
+        <a:prstGeom prst="chevron">
+          <a:avLst/>
+        </a:prstGeom>
+        <a:solidFill>
+          <a:srgbClr val="F8AB6C"/>
+        </a:solidFill>
+        <a:ln w="25400" cap="flat" cmpd="sng" algn="ctr">
+          <a:solidFill>
+            <a:schemeClr val="lt1">
+              <a:hueOff val="0"/>
+              <a:satOff val="0"/>
+              <a:lumOff val="0"/>
+              <a:alphaOff val="0"/>
+            </a:schemeClr>
+          </a:solidFill>
+          <a:prstDash val="solid"/>
+        </a:ln>
+        <a:effectLst/>
+      </dsp:spPr>
+      <dsp:style>
+        <a:lnRef idx="2">
+          <a:scrgbClr r="0" g="0" b="0"/>
+        </a:lnRef>
+        <a:fillRef idx="1">
+          <a:scrgbClr r="0" g="0" b="0"/>
+        </a:fillRef>
+        <a:effectRef idx="0">
+          <a:scrgbClr r="0" g="0" b="0"/>
+        </a:effectRef>
+        <a:fontRef idx="minor">
+          <a:schemeClr val="lt1"/>
+        </a:fontRef>
+      </dsp:style>
+      <dsp:txBody>
+        <a:bodyPr spcFirstLastPara="0" vert="horz" wrap="square" lIns="68009" tIns="45339" rIns="22670" bIns="45339" numCol="1" spcCol="1270" anchor="ctr" anchorCtr="0">
+          <a:noAutofit/>
+        </a:bodyPr>
+        <a:lstStyle/>
+        <a:p>
+          <a:pPr lvl="0" algn="ctr" defTabSz="755650">
+            <a:lnSpc>
+              <a:spcPct val="90000"/>
+            </a:lnSpc>
+            <a:spcBef>
+              <a:spcPct val="0"/>
+            </a:spcBef>
+            <a:spcAft>
+              <a:spcPct val="35000"/>
+            </a:spcAft>
+          </a:pPr>
+          <a:r>
+            <a:rPr lang="fr-FR" sz="1700" kern="1200" dirty="0" smtClean="0"/>
+            <a:t>        Le chat             .</a:t>
+          </a:r>
+          <a:endParaRPr lang="fr-FR" sz="1700" kern="1200" dirty="0"/>
+        </a:p>
+      </dsp:txBody>
+      <dsp:txXfrm>
+        <a:off x="2036328" y="0"/>
+        <a:ext cx="1985579" cy="342726"/>
+      </dsp:txXfrm>
+    </dsp:sp>
+    <dsp:sp modelId="{78EDF3AE-B3A5-4ADD-8D56-731F1A2BDD36}">
+      <dsp:nvSpPr>
+        <dsp:cNvPr id="0" name=""/>
+        <dsp:cNvSpPr/>
+      </dsp:nvSpPr>
+      <dsp:spPr>
+        <a:xfrm>
+          <a:off x="3727609" y="0"/>
+          <a:ext cx="2328305" cy="342726"/>
+        </a:xfrm>
+        <a:prstGeom prst="chevron">
+          <a:avLst/>
+        </a:prstGeom>
+        <a:solidFill>
+          <a:srgbClr val="D67204"/>
+        </a:solidFill>
+        <a:ln w="25400" cap="flat" cmpd="sng" algn="ctr">
+          <a:solidFill>
+            <a:schemeClr val="lt1">
+              <a:hueOff val="0"/>
+              <a:satOff val="0"/>
+              <a:lumOff val="0"/>
+              <a:alphaOff val="0"/>
+            </a:schemeClr>
+          </a:solidFill>
+          <a:prstDash val="solid"/>
+        </a:ln>
+        <a:effectLst/>
+      </dsp:spPr>
+      <dsp:style>
+        <a:lnRef idx="2">
+          <a:scrgbClr r="0" g="0" b="0"/>
+        </a:lnRef>
+        <a:fillRef idx="1">
+          <a:scrgbClr r="0" g="0" b="0"/>
+        </a:fillRef>
+        <a:effectRef idx="0">
+          <a:scrgbClr r="0" g="0" b="0"/>
+        </a:effectRef>
+        <a:fontRef idx="minor">
+          <a:schemeClr val="lt1"/>
+        </a:fontRef>
+      </dsp:style>
+      <dsp:txBody>
+        <a:bodyPr spcFirstLastPara="0" vert="horz" wrap="square" lIns="68009" tIns="45339" rIns="22670" bIns="45339" numCol="1" spcCol="1270" anchor="ctr" anchorCtr="0">
+          <a:noAutofit/>
+        </a:bodyPr>
+        <a:lstStyle/>
+        <a:p>
+          <a:pPr lvl="0" algn="ctr" defTabSz="755650">
+            <a:lnSpc>
+              <a:spcPct val="90000"/>
+            </a:lnSpc>
+            <a:spcBef>
+              <a:spcPct val="0"/>
+            </a:spcBef>
+            <a:spcAft>
+              <a:spcPct val="35000"/>
+            </a:spcAft>
+          </a:pPr>
+          <a:r>
+            <a:rPr lang="fr-FR" sz="1700" kern="1200" dirty="0" smtClean="0"/>
+            <a:t>     Le serveur           .</a:t>
+          </a:r>
+          <a:endParaRPr lang="fr-FR" sz="1700" kern="1200" dirty="0"/>
+        </a:p>
+      </dsp:txBody>
+      <dsp:txXfrm>
+        <a:off x="3898972" y="0"/>
+        <a:ext cx="1985579" cy="342726"/>
+      </dsp:txXfrm>
+    </dsp:sp>
+    <dsp:sp modelId="{1592D397-8A22-433A-96C5-CEDBC9D6D623}">
+      <dsp:nvSpPr>
+        <dsp:cNvPr id="0" name=""/>
+        <dsp:cNvSpPr/>
+      </dsp:nvSpPr>
+      <dsp:spPr>
+        <a:xfrm>
+          <a:off x="5590253" y="0"/>
+          <a:ext cx="2328305" cy="342726"/>
+        </a:xfrm>
+        <a:prstGeom prst="chevron">
+          <a:avLst/>
+        </a:prstGeom>
+        <a:solidFill>
+          <a:srgbClr val="F8AB6C"/>
+        </a:solidFill>
+        <a:ln w="25400" cap="flat" cmpd="sng" algn="ctr">
+          <a:solidFill>
+            <a:schemeClr val="lt1">
+              <a:hueOff val="0"/>
+              <a:satOff val="0"/>
+              <a:lumOff val="0"/>
+              <a:alphaOff val="0"/>
+            </a:schemeClr>
+          </a:solidFill>
+          <a:prstDash val="solid"/>
+        </a:ln>
+        <a:effectLst/>
+      </dsp:spPr>
+      <dsp:style>
+        <a:lnRef idx="2">
+          <a:scrgbClr r="0" g="0" b="0"/>
+        </a:lnRef>
+        <a:fillRef idx="1">
+          <a:scrgbClr r="0" g="0" b="0"/>
+        </a:fillRef>
+        <a:effectRef idx="0">
+          <a:scrgbClr r="0" g="0" b="0"/>
+        </a:effectRef>
+        <a:fontRef idx="minor">
+          <a:schemeClr val="lt1"/>
+        </a:fontRef>
+      </dsp:style>
+      <dsp:txBody>
+        <a:bodyPr spcFirstLastPara="0" vert="horz" wrap="square" lIns="68009" tIns="45339" rIns="22670" bIns="45339" numCol="1" spcCol="1270" anchor="ctr" anchorCtr="0">
+          <a:noAutofit/>
+        </a:bodyPr>
+        <a:lstStyle/>
+        <a:p>
+          <a:pPr lvl="0" algn="ctr" defTabSz="755650">
+            <a:lnSpc>
+              <a:spcPct val="90000"/>
+            </a:lnSpc>
+            <a:spcBef>
+              <a:spcPct val="0"/>
+            </a:spcBef>
+            <a:spcAft>
+              <a:spcPct val="35000"/>
+            </a:spcAft>
+          </a:pPr>
+          <a:r>
+            <a:rPr lang="fr-FR" sz="1700" kern="1200" dirty="0" smtClean="0"/>
+            <a:t>Conclusion</a:t>
+          </a:r>
+          <a:endParaRPr lang="fr-FR" sz="1700" kern="1200" dirty="0"/>
+        </a:p>
+      </dsp:txBody>
+      <dsp:txXfrm>
+        <a:off x="5761616" y="0"/>
+        <a:ext cx="1985579" cy="342726"/>
+      </dsp:txXfrm>
+    </dsp:sp>
   </dsp:spTree>
 </dsp:drawing>
 </file>
@@ -17833,7 +18985,7 @@
           <a:p>
             <a:fld id="{0B91DFF5-C62D-44F6-82F0-F6C097988AF4}" type="datetimeFigureOut">
               <a:rPr lang="fr-FR" smtClean="0"/>
-              <a:t>13/03/2014</a:t>
+              <a:t>14/03/2014</a:t>
             </a:fld>
             <a:endParaRPr lang="fr-FR"/>
           </a:p>
@@ -18817,106 +19969,6 @@
           <a:bodyPr/>
           <a:lstStyle/>
           <a:p>
-            <a:r>
-              <a:rPr lang="fr-FR" dirty="0" smtClean="0"/>
-              <a:t>Le serveur</a:t>
-            </a:r>
-            <a:r>
-              <a:rPr lang="fr-FR" baseline="0" dirty="0" smtClean="0"/>
-              <a:t> est l’entité qui gère le jeu :</a:t>
-            </a:r>
-          </a:p>
-          <a:p>
-            <a:pPr marL="171450" indent="-171450">
-              <a:buFontTx/>
-              <a:buChar char="-"/>
-            </a:pPr>
-            <a:r>
-              <a:rPr lang="fr-FR" baseline="0" dirty="0" smtClean="0"/>
-              <a:t>Il vérifie les coups</a:t>
-            </a:r>
-          </a:p>
-          <a:p>
-            <a:pPr marL="171450" indent="-171450">
-              <a:buFontTx/>
-              <a:buChar char="-"/>
-            </a:pPr>
-            <a:r>
-              <a:rPr lang="fr-FR" baseline="0" dirty="0" smtClean="0"/>
-              <a:t>Traite les déplacements / combats</a:t>
-            </a:r>
-          </a:p>
-          <a:p>
-            <a:pPr marL="171450" indent="-171450">
-              <a:buFontTx/>
-              <a:buChar char="-"/>
-            </a:pPr>
-            <a:r>
-              <a:rPr lang="fr-FR" baseline="0" dirty="0" smtClean="0"/>
-              <a:t>Renvoi aux clients les informations nécessaire pour jouer le prochain tour</a:t>
-            </a:r>
-          </a:p>
-          <a:p>
-            <a:pPr marL="171450" indent="-171450">
-              <a:buFontTx/>
-              <a:buChar char="-"/>
-            </a:pPr>
-            <a:r>
-              <a:rPr lang="fr-FR" baseline="0" dirty="0" smtClean="0"/>
-              <a:t>Détermine le vainqueur</a:t>
-            </a:r>
-          </a:p>
-          <a:p>
-            <a:pPr marL="171450" indent="-171450">
-              <a:buFontTx/>
-              <a:buChar char="-"/>
-            </a:pPr>
-            <a:endParaRPr lang="fr-FR" baseline="0" dirty="0" smtClean="0"/>
-          </a:p>
-          <a:p>
-            <a:pPr marL="0" indent="0">
-              <a:buFontTx/>
-              <a:buNone/>
-            </a:pPr>
-            <a:r>
-              <a:rPr lang="fr-FR" baseline="0" dirty="0" smtClean="0"/>
-              <a:t>Le serveur est aussi chargé de la persistance des données, en effet, il est le seul à accéder à la BDD et y stocke les différentes informations.</a:t>
-            </a:r>
-          </a:p>
-          <a:p>
-            <a:pPr marL="0" indent="0">
-              <a:buFontTx/>
-              <a:buNone/>
-            </a:pPr>
-            <a:r>
-              <a:rPr lang="fr-FR" baseline="0" dirty="0" smtClean="0"/>
-              <a:t>Dans une version, plus aboutie du jeu, il est prévu de stocker l’ensemble des informations d’une partie, afin de permettre aux utilisateurs de la revoir.</a:t>
-            </a:r>
-          </a:p>
-          <a:p>
-            <a:pPr marL="0" indent="0">
-              <a:buFontTx/>
-              <a:buNone/>
-            </a:pPr>
-            <a:endParaRPr lang="fr-FR" baseline="0" dirty="0" smtClean="0"/>
-          </a:p>
-          <a:p>
-            <a:pPr marL="0" indent="0">
-              <a:buFontTx/>
-              <a:buNone/>
-            </a:pPr>
-            <a:r>
-              <a:rPr lang="fr-FR" baseline="0" dirty="0" smtClean="0"/>
-              <a:t>Une planification à long terme est prévue pour le serveur puisque nous avons aussi envisagés les traitements liés au jeu avec les cartes bonus, </a:t>
-            </a:r>
-            <a:r>
-              <a:rPr lang="fr-FR" baseline="0" dirty="0" err="1" smtClean="0"/>
-              <a:t>etc</a:t>
-            </a:r>
-            <a:r>
-              <a:rPr lang="fr-FR" baseline="0" dirty="0" smtClean="0"/>
-              <a:t> …</a:t>
-            </a:r>
             <a:endParaRPr lang="fr-FR" dirty="0"/>
           </a:p>
         </p:txBody>
@@ -19348,7 +20400,7 @@
               <a:pPr>
                 <a:defRPr/>
               </a:pPr>
-              <a:t>13/03/2014</a:t>
+              <a:t>14/03/2014</a:t>
             </a:fld>
             <a:endParaRPr lang="fr-FR"/>
           </a:p>
@@ -19545,7 +20597,7 @@
               <a:pPr>
                 <a:defRPr/>
               </a:pPr>
-              <a:t>13/03/2014</a:t>
+              <a:t>14/03/2014</a:t>
             </a:fld>
             <a:endParaRPr lang="fr-FR"/>
           </a:p>
@@ -19752,7 +20804,7 @@
               <a:pPr>
                 <a:defRPr/>
               </a:pPr>
-              <a:t>13/03/2014</a:t>
+              <a:t>14/03/2014</a:t>
             </a:fld>
             <a:endParaRPr lang="fr-FR"/>
           </a:p>
@@ -19949,7 +21001,7 @@
               <a:pPr>
                 <a:defRPr/>
               </a:pPr>
-              <a:t>13/03/2014</a:t>
+              <a:t>14/03/2014</a:t>
             </a:fld>
             <a:endParaRPr lang="fr-FR"/>
           </a:p>
@@ -20222,7 +21274,7 @@
               <a:pPr>
                 <a:defRPr/>
               </a:pPr>
-              <a:t>13/03/2014</a:t>
+              <a:t>14/03/2014</a:t>
             </a:fld>
             <a:endParaRPr lang="fr-FR"/>
           </a:p>
@@ -20537,7 +21589,7 @@
               <a:pPr>
                 <a:defRPr/>
               </a:pPr>
-              <a:t>13/03/2014</a:t>
+              <a:t>14/03/2014</a:t>
             </a:fld>
             <a:endParaRPr lang="fr-FR"/>
           </a:p>
@@ -20986,7 +22038,7 @@
               <a:pPr>
                 <a:defRPr/>
               </a:pPr>
-              <a:t>13/03/2014</a:t>
+              <a:t>14/03/2014</a:t>
             </a:fld>
             <a:endParaRPr lang="fr-FR"/>
           </a:p>
@@ -21131,7 +22183,7 @@
               <a:pPr>
                 <a:defRPr/>
               </a:pPr>
-              <a:t>13/03/2014</a:t>
+              <a:t>14/03/2014</a:t>
             </a:fld>
             <a:endParaRPr lang="fr-FR"/>
           </a:p>
@@ -21253,7 +22305,7 @@
               <a:pPr>
                 <a:defRPr/>
               </a:pPr>
-              <a:t>13/03/2014</a:t>
+              <a:t>14/03/2014</a:t>
             </a:fld>
             <a:endParaRPr lang="fr-FR"/>
           </a:p>
@@ -21557,7 +22609,7 @@
               <a:pPr>
                 <a:defRPr/>
               </a:pPr>
-              <a:t>13/03/2014</a:t>
+              <a:t>14/03/2014</a:t>
             </a:fld>
             <a:endParaRPr lang="fr-FR"/>
           </a:p>
@@ -21840,7 +22892,7 @@
               <a:pPr>
                 <a:defRPr/>
               </a:pPr>
-              <a:t>13/03/2014</a:t>
+              <a:t>14/03/2014</a:t>
             </a:fld>
             <a:endParaRPr lang="fr-FR"/>
           </a:p>
@@ -21925,7 +22977,7 @@
       <p:bgPr>
         <a:blipFill dpi="0" rotWithShape="1">
           <a:blip r:embed="rId13">
-            <a:alphaModFix amt="25000"/>
+            <a:alphaModFix amt="15000"/>
             <a:lum/>
           </a:blip>
           <a:srcRect/>
@@ -22143,7 +23195,7 @@
               <a:pPr>
                 <a:defRPr/>
               </a:pPr>
-              <a:t>13/03/2014</a:t>
+              <a:t>14/03/2014</a:t>
             </a:fld>
             <a:endParaRPr lang="fr-FR"/>
           </a:p>
@@ -22657,7 +23709,6 @@
       <p:bgPr>
         <a:blipFill dpi="0" rotWithShape="1">
           <a:blip r:embed="rId3">
-            <a:alphaModFix amt="85000"/>
             <a:lum/>
           </a:blip>
           <a:srcRect/>
@@ -23071,8 +24122,13 @@
             <a:pPr eaLnBrk="1" hangingPunct="1"/>
             <a:r>
               <a:rPr lang="fr-FR" dirty="0" smtClean="0"/>
-              <a:t>Equipe :</a:t>
+              <a:t>Equipe </a:t>
             </a:r>
+            <a:r>
+              <a:rPr lang="fr-FR" dirty="0" smtClean="0"/>
+              <a:t>: Conseil 7</a:t>
+            </a:r>
+            <a:endParaRPr lang="fr-FR" dirty="0" smtClean="0"/>
           </a:p>
           <a:p>
             <a:pPr eaLnBrk="1" hangingPunct="1"/>
@@ -25001,7 +26057,7 @@
           <a:p>
             <a:r>
               <a:rPr lang="fr-FR" dirty="0" smtClean="0"/>
-              <a:t>Entité de traitement du jeu</a:t>
+              <a:t>Structure du programme opérationnelle</a:t>
             </a:r>
           </a:p>
           <a:p>
@@ -25010,7 +26066,7 @@
           <a:p>
             <a:r>
               <a:rPr lang="fr-FR" dirty="0" smtClean="0"/>
-              <a:t>Gère la persistance des données</a:t>
+              <a:t>Ajout de commandes serveur simplifiés</a:t>
             </a:r>
           </a:p>
           <a:p>
@@ -25019,15 +26075,17 @@
           <a:p>
             <a:r>
               <a:rPr lang="fr-FR" dirty="0" smtClean="0"/>
-              <a:t>Une planification à </a:t>
+              <a:t>Séparation des parties technique et jeu</a:t>
             </a:r>
-            <a:r>
-              <a:rPr lang="fr-FR" smtClean="0"/>
-              <a:t>long terme </a:t>
-            </a:r>
+            <a:endParaRPr lang="fr-FR" dirty="0" smtClean="0"/>
+          </a:p>
+          <a:p>
+            <a:endParaRPr lang="fr-FR" sz="1200" dirty="0" smtClean="0"/>
+          </a:p>
+          <a:p>
             <a:r>
               <a:rPr lang="fr-FR" dirty="0" smtClean="0"/>
-              <a:t>(cartes, …)</a:t>
+              <a:t>Persistance des données via entités-managers</a:t>
             </a:r>
           </a:p>
           <a:p>
@@ -25036,17 +26094,9 @@
           <a:p>
             <a:r>
               <a:rPr lang="fr-FR" dirty="0" smtClean="0"/>
-              <a:t>… A finir</a:t>
+              <a:t>Modèle métier conçu et mis en place</a:t>
             </a:r>
-          </a:p>
-          <a:p>
-            <a:endParaRPr lang="fr-FR" sz="1200" dirty="0"/>
-          </a:p>
-          <a:p>
-            <a:r>
-              <a:rPr lang="fr-FR" dirty="0" smtClean="0"/>
-              <a:t>…</a:t>
-            </a:r>
+            <a:endParaRPr lang="fr-FR" dirty="0" smtClean="0"/>
           </a:p>
         </p:txBody>
       </p:sp>

</xml_diff>